<commit_message>
Camille : MAJ diapo
Avancement des étapes réalisées sur le diapo
</commit_message>
<xml_diff>
--- a/Présentation UPOP.pptx
+++ b/Présentation UPOP.pptx
@@ -5,7 +5,7 @@
     <p:sldMasterId id="2147483648" r:id="rId1"/>
   </p:sldMasterIdLst>
   <p:notesMasterIdLst>
-    <p:notesMasterId r:id="rId17"/>
+    <p:notesMasterId r:id="rId19"/>
   </p:notesMasterIdLst>
   <p:sldIdLst>
     <p:sldId id="270" r:id="rId2"/>
@@ -23,6 +23,8 @@
     <p:sldId id="267" r:id="rId14"/>
     <p:sldId id="268" r:id="rId15"/>
     <p:sldId id="265" r:id="rId16"/>
+    <p:sldId id="271" r:id="rId17"/>
+    <p:sldId id="272" r:id="rId18"/>
   </p:sldIdLst>
   <p:sldSz cx="12192000" cy="6858000"/>
   <p:notesSz cx="6858000" cy="9144000"/>
@@ -215,7 +217,7 @@
           <a:p>
             <a:fld id="{64F3B9CB-A3A7-4201-8496-2CBC87780604}" type="datetimeFigureOut">
               <a:rPr lang="fr-FR" smtClean="0"/>
-              <a:t>16/11/2017</a:t>
+              <a:t>17/11/2017</a:t>
             </a:fld>
             <a:endParaRPr lang="fr-FR"/>
           </a:p>
@@ -713,7 +715,7 @@
           <a:p>
             <a:fld id="{EF339115-3077-41F7-8CCB-1E5454686776}" type="datetimeFigureOut">
               <a:rPr lang="fr-FR" smtClean="0"/>
-              <a:t>16/11/2017</a:t>
+              <a:t>17/11/2017</a:t>
             </a:fld>
             <a:endParaRPr lang="fr-FR"/>
           </a:p>
@@ -911,7 +913,7 @@
           <a:p>
             <a:fld id="{EF339115-3077-41F7-8CCB-1E5454686776}" type="datetimeFigureOut">
               <a:rPr lang="fr-FR" smtClean="0"/>
-              <a:t>16/11/2017</a:t>
+              <a:t>17/11/2017</a:t>
             </a:fld>
             <a:endParaRPr lang="fr-FR"/>
           </a:p>
@@ -1119,7 +1121,7 @@
           <a:p>
             <a:fld id="{EF339115-3077-41F7-8CCB-1E5454686776}" type="datetimeFigureOut">
               <a:rPr lang="fr-FR" smtClean="0"/>
-              <a:t>16/11/2017</a:t>
+              <a:t>17/11/2017</a:t>
             </a:fld>
             <a:endParaRPr lang="fr-FR"/>
           </a:p>
@@ -1317,7 +1319,7 @@
           <a:p>
             <a:fld id="{EF339115-3077-41F7-8CCB-1E5454686776}" type="datetimeFigureOut">
               <a:rPr lang="fr-FR" smtClean="0"/>
-              <a:t>16/11/2017</a:t>
+              <a:t>17/11/2017</a:t>
             </a:fld>
             <a:endParaRPr lang="fr-FR"/>
           </a:p>
@@ -1592,7 +1594,7 @@
           <a:p>
             <a:fld id="{EF339115-3077-41F7-8CCB-1E5454686776}" type="datetimeFigureOut">
               <a:rPr lang="fr-FR" smtClean="0"/>
-              <a:t>16/11/2017</a:t>
+              <a:t>17/11/2017</a:t>
             </a:fld>
             <a:endParaRPr lang="fr-FR"/>
           </a:p>
@@ -1857,7 +1859,7 @@
           <a:p>
             <a:fld id="{EF339115-3077-41F7-8CCB-1E5454686776}" type="datetimeFigureOut">
               <a:rPr lang="fr-FR" smtClean="0"/>
-              <a:t>16/11/2017</a:t>
+              <a:t>17/11/2017</a:t>
             </a:fld>
             <a:endParaRPr lang="fr-FR"/>
           </a:p>
@@ -2269,7 +2271,7 @@
           <a:p>
             <a:fld id="{EF339115-3077-41F7-8CCB-1E5454686776}" type="datetimeFigureOut">
               <a:rPr lang="fr-FR" smtClean="0"/>
-              <a:t>16/11/2017</a:t>
+              <a:t>17/11/2017</a:t>
             </a:fld>
             <a:endParaRPr lang="fr-FR"/>
           </a:p>
@@ -2410,7 +2412,7 @@
           <a:p>
             <a:fld id="{EF339115-3077-41F7-8CCB-1E5454686776}" type="datetimeFigureOut">
               <a:rPr lang="fr-FR" smtClean="0"/>
-              <a:t>16/11/2017</a:t>
+              <a:t>17/11/2017</a:t>
             </a:fld>
             <a:endParaRPr lang="fr-FR"/>
           </a:p>
@@ -2523,7 +2525,7 @@
           <a:p>
             <a:fld id="{EF339115-3077-41F7-8CCB-1E5454686776}" type="datetimeFigureOut">
               <a:rPr lang="fr-FR" smtClean="0"/>
-              <a:t>16/11/2017</a:t>
+              <a:t>17/11/2017</a:t>
             </a:fld>
             <a:endParaRPr lang="fr-FR"/>
           </a:p>
@@ -2834,7 +2836,7 @@
           <a:p>
             <a:fld id="{EF339115-3077-41F7-8CCB-1E5454686776}" type="datetimeFigureOut">
               <a:rPr lang="fr-FR" smtClean="0"/>
-              <a:t>16/11/2017</a:t>
+              <a:t>17/11/2017</a:t>
             </a:fld>
             <a:endParaRPr lang="fr-FR"/>
           </a:p>
@@ -3122,7 +3124,7 @@
           <a:p>
             <a:fld id="{EF339115-3077-41F7-8CCB-1E5454686776}" type="datetimeFigureOut">
               <a:rPr lang="fr-FR" smtClean="0"/>
-              <a:t>16/11/2017</a:t>
+              <a:t>17/11/2017</a:t>
             </a:fld>
             <a:endParaRPr lang="fr-FR"/>
           </a:p>
@@ -3363,7 +3365,7 @@
           <a:p>
             <a:fld id="{EF339115-3077-41F7-8CCB-1E5454686776}" type="datetimeFigureOut">
               <a:rPr lang="fr-FR" smtClean="0"/>
-              <a:t>16/11/2017</a:t>
+              <a:t>17/11/2017</a:t>
             </a:fld>
             <a:endParaRPr lang="fr-FR"/>
           </a:p>
@@ -5256,8 +5258,8 @@
         </p:nvSpPr>
         <p:spPr>
           <a:xfrm>
-            <a:off x="2309567" y="1583703"/>
-            <a:ext cx="2677212" cy="1200329"/>
+            <a:off x="1128467" y="726453"/>
+            <a:ext cx="11606458" cy="5909310"/>
           </a:xfrm>
           <a:prstGeom prst="rect">
             <a:avLst/>
@@ -5284,7 +5286,31 @@
             </a:r>
             <a:r>
               <a:rPr lang="fr-FR" dirty="0"/>
-              <a:t> : JOUR 4</a:t>
+              <a:t> et réalisé : JOUR 4</a:t>
+            </a:r>
+          </a:p>
+          <a:p>
+            <a:r>
+              <a:rPr lang="fr-FR" dirty="0"/>
+              <a:t>Page de connexion </a:t>
+            </a:r>
+          </a:p>
+          <a:p>
+            <a:r>
+              <a:rPr lang="fr-FR" dirty="0"/>
+              <a:t>(PHP utilisateur dans la base)</a:t>
+            </a:r>
+          </a:p>
+          <a:p>
+            <a:r>
+              <a:rPr lang="fr-FR" dirty="0"/>
+              <a:t>Créer page d'inscription - reste a faire communiqué</a:t>
+            </a:r>
+          </a:p>
+          <a:p>
+            <a:r>
+              <a:rPr lang="fr-FR" dirty="0"/>
+              <a:t>harmonisation du site</a:t>
             </a:r>
           </a:p>
           <a:p>
@@ -5293,7 +5319,100 @@
           <a:p>
             <a:r>
               <a:rPr lang="fr-FR" dirty="0"/>
-              <a:t>Objectif réalisé  JOUR 4 :</a:t>
+              <a:t>Page de compte structure du site</a:t>
+            </a:r>
+          </a:p>
+          <a:p>
+            <a:r>
+              <a:rPr lang="fr-FR" dirty="0"/>
+              <a:t>Page d'administrateur - à mettre en harmonisation</a:t>
+            </a:r>
+          </a:p>
+          <a:p>
+            <a:endParaRPr lang="fr-FR" dirty="0"/>
+          </a:p>
+          <a:p>
+            <a:r>
+              <a:rPr lang="fr-FR" dirty="0"/>
+              <a:t>Page CSS main.css en place </a:t>
+            </a:r>
+          </a:p>
+          <a:p>
+            <a:r>
+              <a:rPr lang="fr-FR" dirty="0"/>
+              <a:t>Uniformisé tout les CSS du site</a:t>
+            </a:r>
+          </a:p>
+          <a:p>
+            <a:r>
+              <a:rPr lang="fr-FR" dirty="0"/>
+              <a:t>Rectification de la page panier - a terminé</a:t>
+            </a:r>
+          </a:p>
+          <a:p>
+            <a:endParaRPr lang="fr-FR" dirty="0"/>
+          </a:p>
+          <a:p>
+            <a:r>
+              <a:rPr lang="fr-FR" dirty="0" err="1"/>
+              <a:t>Recupération</a:t>
+            </a:r>
+            <a:r>
+              <a:rPr lang="fr-FR" dirty="0"/>
+              <a:t> des données articles</a:t>
+            </a:r>
+          </a:p>
+          <a:p>
+            <a:r>
+              <a:rPr lang="fr-FR" dirty="0" err="1"/>
+              <a:t>Requete</a:t>
+            </a:r>
+            <a:r>
+              <a:rPr lang="fr-FR" dirty="0"/>
+              <a:t> SQL</a:t>
+            </a:r>
+          </a:p>
+          <a:p>
+            <a:r>
+              <a:rPr lang="fr-FR" dirty="0"/>
+              <a:t>Partie connexion PHP (créer une </a:t>
+            </a:r>
+            <a:r>
+              <a:rPr lang="fr-FR" dirty="0" err="1"/>
+              <a:t>sesison</a:t>
+            </a:r>
+            <a:r>
+              <a:rPr lang="fr-FR" dirty="0"/>
+              <a:t>)</a:t>
+            </a:r>
+          </a:p>
+          <a:p>
+            <a:r>
+              <a:rPr lang="fr-FR" dirty="0"/>
+              <a:t>Mise en place du diaporama</a:t>
+            </a:r>
+          </a:p>
+          <a:p>
+            <a:endParaRPr lang="fr-FR" dirty="0"/>
+          </a:p>
+          <a:p>
+            <a:r>
+              <a:rPr lang="fr-FR" dirty="0"/>
+              <a:t>Bloque </a:t>
+            </a:r>
+            <a:r>
+              <a:rPr lang="fr-FR" dirty="0" err="1"/>
+              <a:t>modele</a:t>
+            </a:r>
+            <a:r>
+              <a:rPr lang="fr-FR" dirty="0"/>
+              <a:t> page figurine</a:t>
+            </a:r>
+          </a:p>
+          <a:p>
+            <a:r>
+              <a:rPr lang="fr-FR" dirty="0"/>
+              <a:t>Nettoyage code</a:t>
             </a:r>
           </a:p>
           <a:p>
@@ -5477,8 +5596,8 @@
         </p:nvSpPr>
         <p:spPr>
           <a:xfrm>
-            <a:off x="3959258" y="1696825"/>
-            <a:ext cx="2837468" cy="1477328"/>
+            <a:off x="172149" y="0"/>
+            <a:ext cx="11847699" cy="6740307"/>
           </a:xfrm>
           <a:prstGeom prst="rect">
             <a:avLst/>
@@ -5492,36 +5611,225 @@
           <a:lstStyle/>
           <a:p>
             <a:r>
+              <a:rPr lang="fr-FR" dirty="0"/>
+              <a:t>Journée 5 : REALISEE</a:t>
+            </a:r>
+          </a:p>
+          <a:p>
+            <a:endParaRPr lang="fr-FR" dirty="0"/>
+          </a:p>
+          <a:p>
+            <a:r>
+              <a:rPr lang="fr-FR" dirty="0"/>
+              <a:t>La modification de la </a:t>
+            </a:r>
+            <a:r>
               <a:rPr lang="fr-FR" dirty="0" err="1"/>
-              <a:t>Ojectif</a:t>
-            </a:r>
-            <a:r>
-              <a:rPr lang="fr-FR" dirty="0"/>
-              <a:t> à </a:t>
+              <a:t>Navbar</a:t>
+            </a:r>
+            <a:r>
+              <a:rPr lang="fr-FR" dirty="0"/>
+              <a:t> : centrée icone + fixée la </a:t>
             </a:r>
             <a:r>
               <a:rPr lang="fr-FR" dirty="0" err="1"/>
-              <a:t>realisé</a:t>
-            </a:r>
-            <a:r>
-              <a:rPr lang="fr-FR" dirty="0"/>
-              <a:t> : JOUR 5</a:t>
-            </a:r>
-          </a:p>
-          <a:p>
+              <a:t>navbar</a:t>
+            </a:r>
             <a:endParaRPr lang="fr-FR" dirty="0"/>
           </a:p>
           <a:p>
             <a:r>
-              <a:rPr lang="fr-FR" dirty="0"/>
-              <a:t>Objectif réalisé  JOUR 5  :</a:t>
-            </a:r>
-          </a:p>
-          <a:p>
-            <a:endParaRPr lang="fr-FR" dirty="0"/>
-          </a:p>
-          <a:p>
-            <a:endParaRPr lang="fr-FR" dirty="0"/>
+              <a:rPr lang="fr-FR" dirty="0" err="1"/>
+              <a:t>magin</a:t>
+            </a:r>
+            <a:r>
+              <a:rPr lang="fr-FR" dirty="0"/>
+              <a:t>-top en place sur la </a:t>
+            </a:r>
+            <a:r>
+              <a:rPr lang="fr-FR" dirty="0" err="1"/>
+              <a:t>navbar</a:t>
+            </a:r>
+            <a:r>
+              <a:rPr lang="fr-FR" dirty="0"/>
+              <a:t> : remise en place des structures de page</a:t>
+            </a:r>
+          </a:p>
+          <a:p>
+            <a:r>
+              <a:rPr lang="fr-FR" dirty="0"/>
+              <a:t>Page contact : </a:t>
+            </a:r>
+          </a:p>
+          <a:p>
+            <a:r>
+              <a:rPr lang="fr-FR" dirty="0"/>
+              <a:t>Enlevé la bordure grise (optimiser à la forme du site)</a:t>
+            </a:r>
+          </a:p>
+          <a:p>
+            <a:r>
+              <a:rPr lang="fr-FR" dirty="0"/>
+              <a:t>Adresse = panel panel-default (intégrer)</a:t>
+            </a:r>
+          </a:p>
+          <a:p>
+            <a:r>
+              <a:rPr lang="fr-FR" dirty="0"/>
+              <a:t>Page figurine :</a:t>
+            </a:r>
+          </a:p>
+          <a:p>
+            <a:r>
+              <a:rPr lang="fr-FR" dirty="0"/>
+              <a:t>Modification du modèle de figurine </a:t>
+            </a:r>
+          </a:p>
+          <a:p>
+            <a:r>
+              <a:rPr lang="fr-FR" dirty="0"/>
+              <a:t>détourage des images (articles)</a:t>
+            </a:r>
+          </a:p>
+          <a:p>
+            <a:r>
+              <a:rPr lang="fr-FR" dirty="0"/>
+              <a:t>Page accueil :</a:t>
+            </a:r>
+          </a:p>
+          <a:p>
+            <a:r>
+              <a:rPr lang="fr-FR" dirty="0" err="1"/>
+              <a:t>suppresion</a:t>
+            </a:r>
+            <a:r>
+              <a:rPr lang="fr-FR" dirty="0"/>
+              <a:t> du </a:t>
+            </a:r>
+            <a:r>
+              <a:rPr lang="fr-FR" dirty="0" err="1"/>
+              <a:t>caroussel</a:t>
+            </a:r>
+            <a:r>
+              <a:rPr lang="fr-FR" dirty="0"/>
+              <a:t> = a la place vidéo (je pose le code vidéo - anis/</a:t>
+            </a:r>
+            <a:r>
+              <a:rPr lang="fr-FR" dirty="0" err="1"/>
+              <a:t>jc</a:t>
+            </a:r>
+            <a:r>
+              <a:rPr lang="fr-FR" dirty="0"/>
+              <a:t> télécharge la vidéo) dans le container </a:t>
+            </a:r>
+          </a:p>
+          <a:p>
+            <a:r>
+              <a:rPr lang="fr-FR" dirty="0"/>
+              <a:t>Remplacé </a:t>
+            </a:r>
+            <a:r>
+              <a:rPr lang="fr-FR" dirty="0" err="1"/>
+              <a:t>deadpool</a:t>
+            </a:r>
+            <a:r>
+              <a:rPr lang="fr-FR" dirty="0"/>
+              <a:t> par un </a:t>
+            </a:r>
+            <a:r>
+              <a:rPr lang="fr-FR" dirty="0" err="1"/>
+              <a:t>caroussel</a:t>
+            </a:r>
+            <a:r>
+              <a:rPr lang="fr-FR" dirty="0"/>
+              <a:t> </a:t>
+            </a:r>
+          </a:p>
+          <a:p>
+            <a:r>
+              <a:rPr lang="fr-FR" dirty="0"/>
+              <a:t>Page panier :</a:t>
+            </a:r>
+          </a:p>
+          <a:p>
+            <a:r>
+              <a:rPr lang="fr-FR" dirty="0"/>
+              <a:t>Rectification a terminée</a:t>
+            </a:r>
+          </a:p>
+          <a:p>
+            <a:r>
+              <a:rPr lang="fr-FR" dirty="0"/>
+              <a:t>Page compte : </a:t>
+            </a:r>
+          </a:p>
+          <a:p>
+            <a:r>
+              <a:rPr lang="fr-FR" dirty="0"/>
+              <a:t>Structure de page a réaliser concernant l'historique du panier </a:t>
+            </a:r>
+          </a:p>
+          <a:p>
+            <a:r>
+              <a:rPr lang="fr-FR" dirty="0" err="1"/>
+              <a:t>Navbar</a:t>
+            </a:r>
+            <a:r>
+              <a:rPr lang="fr-FR" dirty="0"/>
+              <a:t> : ajouter un bouton déconnexion (en option)</a:t>
+            </a:r>
+          </a:p>
+          <a:p>
+            <a:r>
+              <a:rPr lang="fr-FR" dirty="0"/>
+              <a:t>Fixé en haut en de </a:t>
+            </a:r>
+            <a:r>
+              <a:rPr lang="fr-FR" dirty="0" err="1"/>
+              <a:t>lécran</a:t>
+            </a:r>
+            <a:r>
+              <a:rPr lang="fr-FR" dirty="0"/>
+              <a:t> - même lorsque tu </a:t>
+            </a:r>
+            <a:r>
+              <a:rPr lang="fr-FR" dirty="0" err="1"/>
+              <a:t>scrolls</a:t>
+            </a:r>
+            <a:r>
+              <a:rPr lang="fr-FR" dirty="0"/>
+              <a:t> </a:t>
+            </a:r>
+          </a:p>
+          <a:p>
+            <a:r>
+              <a:rPr lang="fr-FR" dirty="0"/>
+              <a:t>infos bulles sur les icones </a:t>
+            </a:r>
+          </a:p>
+          <a:p>
+            <a:r>
+              <a:rPr lang="fr-FR" dirty="0"/>
+              <a:t>----------------&gt; a finalisé plus tard</a:t>
+            </a:r>
+          </a:p>
+          <a:p>
+            <a:r>
+              <a:rPr lang="fr-FR" dirty="0"/>
+              <a:t>PHP : </a:t>
+            </a:r>
+          </a:p>
+          <a:p>
+            <a:r>
+              <a:rPr lang="fr-FR" dirty="0"/>
+              <a:t>page d'inscription</a:t>
+            </a:r>
+          </a:p>
+          <a:p>
+            <a:r>
+              <a:rPr lang="fr-FR" dirty="0"/>
+              <a:t>page gestion</a:t>
+            </a:r>
           </a:p>
         </p:txBody>
       </p:sp>
@@ -5529,6 +5837,330 @@
     <p:extLst>
       <p:ext uri="{BB962C8B-B14F-4D97-AF65-F5344CB8AC3E}">
         <p14:creationId xmlns:p14="http://schemas.microsoft.com/office/powerpoint/2010/main" val="384764369"/>
+      </p:ext>
+    </p:extLst>
+  </p:cSld>
+  <p:clrMapOvr>
+    <a:masterClrMapping/>
+  </p:clrMapOvr>
+</p:sld>
+</file>
+
+<file path=ppt/slides/slide16.xml><?xml version="1.0" encoding="utf-8"?>
+<p:sld xmlns:a="http://schemas.openxmlformats.org/drawingml/2006/main" xmlns:r="http://schemas.openxmlformats.org/officeDocument/2006/relationships" xmlns:p="http://schemas.openxmlformats.org/presentationml/2006/main">
+  <p:cSld>
+    <p:spTree>
+      <p:nvGrpSpPr>
+        <p:cNvPr id="1" name=""/>
+        <p:cNvGrpSpPr/>
+        <p:nvPr/>
+      </p:nvGrpSpPr>
+      <p:grpSpPr>
+        <a:xfrm>
+          <a:off x="0" y="0"/>
+          <a:ext cx="0" cy="0"/>
+          <a:chOff x="0" y="0"/>
+          <a:chExt cx="0" cy="0"/>
+        </a:xfrm>
+      </p:grpSpPr>
+      <p:sp>
+        <p:nvSpPr>
+          <p:cNvPr id="2" name="Titre 1">
+            <a:extLst>
+              <a:ext uri="{FF2B5EF4-FFF2-40B4-BE49-F238E27FC236}">
+                <a16:creationId xmlns:a16="http://schemas.microsoft.com/office/drawing/2014/main" id="{FC5859B7-5D92-429D-AA36-34CB579D8431}"/>
+              </a:ext>
+            </a:extLst>
+          </p:cNvPr>
+          <p:cNvSpPr>
+            <a:spLocks noGrp="1"/>
+          </p:cNvSpPr>
+          <p:nvPr>
+            <p:ph type="ctrTitle"/>
+          </p:nvPr>
+        </p:nvSpPr>
+        <p:spPr>
+          <a:xfrm>
+            <a:off x="1524000" y="1122363"/>
+            <a:ext cx="9144000" cy="2387600"/>
+          </a:xfrm>
+        </p:spPr>
+        <p:txBody>
+          <a:bodyPr/>
+          <a:lstStyle/>
+          <a:p>
+            <a:endParaRPr lang="fr-FR"/>
+          </a:p>
+        </p:txBody>
+      </p:sp>
+      <p:sp>
+        <p:nvSpPr>
+          <p:cNvPr id="3" name="Sous-titre 2">
+            <a:extLst>
+              <a:ext uri="{FF2B5EF4-FFF2-40B4-BE49-F238E27FC236}">
+                <a16:creationId xmlns:a16="http://schemas.microsoft.com/office/drawing/2014/main" id="{BA6FBF37-8729-41B4-8ECD-04743E2F5227}"/>
+              </a:ext>
+            </a:extLst>
+          </p:cNvPr>
+          <p:cNvSpPr>
+            <a:spLocks noGrp="1"/>
+          </p:cNvSpPr>
+          <p:nvPr>
+            <p:ph type="subTitle" idx="1"/>
+          </p:nvPr>
+        </p:nvSpPr>
+        <p:spPr>
+          <a:xfrm>
+            <a:off x="1524000" y="3602038"/>
+            <a:ext cx="9144000" cy="1655762"/>
+          </a:xfrm>
+        </p:spPr>
+        <p:txBody>
+          <a:bodyPr/>
+          <a:lstStyle/>
+          <a:p>
+            <a:endParaRPr lang="fr-FR"/>
+          </a:p>
+        </p:txBody>
+      </p:sp>
+      <p:pic>
+        <p:nvPicPr>
+          <p:cNvPr id="7" name="Image 6">
+            <a:extLst>
+              <a:ext uri="{FF2B5EF4-FFF2-40B4-BE49-F238E27FC236}">
+                <a16:creationId xmlns:a16="http://schemas.microsoft.com/office/drawing/2014/main" id="{1CB72F68-4AD6-4FB2-9AB8-D6451FA13416}"/>
+              </a:ext>
+            </a:extLst>
+          </p:cNvPr>
+          <p:cNvPicPr>
+            <a:picLocks noChangeAspect="1"/>
+          </p:cNvPicPr>
+          <p:nvPr/>
+        </p:nvPicPr>
+        <p:blipFill>
+          <a:blip r:embed="rId2">
+            <a:extLst>
+              <a:ext uri="{28A0092B-C50C-407E-A947-70E740481C1C}">
+                <a14:useLocalDpi xmlns:a14="http://schemas.microsoft.com/office/drawing/2010/main" val="0"/>
+              </a:ext>
+            </a:extLst>
+          </a:blip>
+          <a:stretch>
+            <a:fillRect/>
+          </a:stretch>
+        </p:blipFill>
+        <p:spPr>
+          <a:xfrm>
+            <a:off x="4542" y="0"/>
+            <a:ext cx="12182915" cy="6858000"/>
+          </a:xfrm>
+          <a:prstGeom prst="rect">
+            <a:avLst/>
+          </a:prstGeom>
+        </p:spPr>
+      </p:pic>
+      <p:pic>
+        <p:nvPicPr>
+          <p:cNvPr id="9" name="Image 8">
+            <a:extLst>
+              <a:ext uri="{FF2B5EF4-FFF2-40B4-BE49-F238E27FC236}">
+                <a16:creationId xmlns:a16="http://schemas.microsoft.com/office/drawing/2014/main" id="{DDD74F79-50B8-4ED4-B6D9-9A7E75EB116D}"/>
+              </a:ext>
+            </a:extLst>
+          </p:cNvPr>
+          <p:cNvPicPr>
+            <a:picLocks noChangeAspect="1"/>
+          </p:cNvPicPr>
+          <p:nvPr/>
+        </p:nvPicPr>
+        <p:blipFill>
+          <a:blip r:embed="rId3">
+            <a:extLst>
+              <a:ext uri="{28A0092B-C50C-407E-A947-70E740481C1C}">
+                <a14:useLocalDpi xmlns:a14="http://schemas.microsoft.com/office/drawing/2010/main" val="0"/>
+              </a:ext>
+            </a:extLst>
+          </a:blip>
+          <a:stretch>
+            <a:fillRect/>
+          </a:stretch>
+        </p:blipFill>
+        <p:spPr>
+          <a:xfrm>
+            <a:off x="10668000" y="5554358"/>
+            <a:ext cx="1574627" cy="1349680"/>
+          </a:xfrm>
+          <a:prstGeom prst="rect">
+            <a:avLst/>
+          </a:prstGeom>
+        </p:spPr>
+      </p:pic>
+    </p:spTree>
+    <p:extLst>
+      <p:ext uri="{BB962C8B-B14F-4D97-AF65-F5344CB8AC3E}">
+        <p14:creationId xmlns:p14="http://schemas.microsoft.com/office/powerpoint/2010/main" val="210633486"/>
+      </p:ext>
+    </p:extLst>
+  </p:cSld>
+  <p:clrMapOvr>
+    <a:masterClrMapping/>
+  </p:clrMapOvr>
+</p:sld>
+</file>
+
+<file path=ppt/slides/slide17.xml><?xml version="1.0" encoding="utf-8"?>
+<p:sld xmlns:a="http://schemas.openxmlformats.org/drawingml/2006/main" xmlns:r="http://schemas.openxmlformats.org/officeDocument/2006/relationships" xmlns:p="http://schemas.openxmlformats.org/presentationml/2006/main">
+  <p:cSld>
+    <p:spTree>
+      <p:nvGrpSpPr>
+        <p:cNvPr id="1" name=""/>
+        <p:cNvGrpSpPr/>
+        <p:nvPr/>
+      </p:nvGrpSpPr>
+      <p:grpSpPr>
+        <a:xfrm>
+          <a:off x="0" y="0"/>
+          <a:ext cx="0" cy="0"/>
+          <a:chOff x="0" y="0"/>
+          <a:chExt cx="0" cy="0"/>
+        </a:xfrm>
+      </p:grpSpPr>
+      <p:sp>
+        <p:nvSpPr>
+          <p:cNvPr id="2" name="Titre 1">
+            <a:extLst>
+              <a:ext uri="{FF2B5EF4-FFF2-40B4-BE49-F238E27FC236}">
+                <a16:creationId xmlns:a16="http://schemas.microsoft.com/office/drawing/2014/main" id="{FC5859B7-5D92-429D-AA36-34CB579D8431}"/>
+              </a:ext>
+            </a:extLst>
+          </p:cNvPr>
+          <p:cNvSpPr>
+            <a:spLocks noGrp="1"/>
+          </p:cNvSpPr>
+          <p:nvPr>
+            <p:ph type="ctrTitle"/>
+          </p:nvPr>
+        </p:nvSpPr>
+        <p:spPr>
+          <a:xfrm>
+            <a:off x="1524000" y="1122363"/>
+            <a:ext cx="9144000" cy="2387600"/>
+          </a:xfrm>
+        </p:spPr>
+        <p:txBody>
+          <a:bodyPr/>
+          <a:lstStyle/>
+          <a:p>
+            <a:endParaRPr lang="fr-FR"/>
+          </a:p>
+        </p:txBody>
+      </p:sp>
+      <p:sp>
+        <p:nvSpPr>
+          <p:cNvPr id="3" name="Sous-titre 2">
+            <a:extLst>
+              <a:ext uri="{FF2B5EF4-FFF2-40B4-BE49-F238E27FC236}">
+                <a16:creationId xmlns:a16="http://schemas.microsoft.com/office/drawing/2014/main" id="{BA6FBF37-8729-41B4-8ECD-04743E2F5227}"/>
+              </a:ext>
+            </a:extLst>
+          </p:cNvPr>
+          <p:cNvSpPr>
+            <a:spLocks noGrp="1"/>
+          </p:cNvSpPr>
+          <p:nvPr>
+            <p:ph type="subTitle" idx="1"/>
+          </p:nvPr>
+        </p:nvSpPr>
+        <p:spPr>
+          <a:xfrm>
+            <a:off x="1524000" y="3602038"/>
+            <a:ext cx="9144000" cy="1655762"/>
+          </a:xfrm>
+        </p:spPr>
+        <p:txBody>
+          <a:bodyPr/>
+          <a:lstStyle/>
+          <a:p>
+            <a:endParaRPr lang="fr-FR"/>
+          </a:p>
+        </p:txBody>
+      </p:sp>
+      <p:pic>
+        <p:nvPicPr>
+          <p:cNvPr id="7" name="Image 6">
+            <a:extLst>
+              <a:ext uri="{FF2B5EF4-FFF2-40B4-BE49-F238E27FC236}">
+                <a16:creationId xmlns:a16="http://schemas.microsoft.com/office/drawing/2014/main" id="{1CB72F68-4AD6-4FB2-9AB8-D6451FA13416}"/>
+              </a:ext>
+            </a:extLst>
+          </p:cNvPr>
+          <p:cNvPicPr>
+            <a:picLocks noChangeAspect="1"/>
+          </p:cNvPicPr>
+          <p:nvPr/>
+        </p:nvPicPr>
+        <p:blipFill>
+          <a:blip r:embed="rId2">
+            <a:extLst>
+              <a:ext uri="{28A0092B-C50C-407E-A947-70E740481C1C}">
+                <a14:useLocalDpi xmlns:a14="http://schemas.microsoft.com/office/drawing/2010/main" val="0"/>
+              </a:ext>
+            </a:extLst>
+          </a:blip>
+          <a:stretch>
+            <a:fillRect/>
+          </a:stretch>
+        </p:blipFill>
+        <p:spPr>
+          <a:xfrm>
+            <a:off x="4542" y="0"/>
+            <a:ext cx="12182915" cy="6858000"/>
+          </a:xfrm>
+          <a:prstGeom prst="rect">
+            <a:avLst/>
+          </a:prstGeom>
+        </p:spPr>
+      </p:pic>
+      <p:pic>
+        <p:nvPicPr>
+          <p:cNvPr id="9" name="Image 8">
+            <a:extLst>
+              <a:ext uri="{FF2B5EF4-FFF2-40B4-BE49-F238E27FC236}">
+                <a16:creationId xmlns:a16="http://schemas.microsoft.com/office/drawing/2014/main" id="{DDD74F79-50B8-4ED4-B6D9-9A7E75EB116D}"/>
+              </a:ext>
+            </a:extLst>
+          </p:cNvPr>
+          <p:cNvPicPr>
+            <a:picLocks noChangeAspect="1"/>
+          </p:cNvPicPr>
+          <p:nvPr/>
+        </p:nvPicPr>
+        <p:blipFill>
+          <a:blip r:embed="rId3">
+            <a:extLst>
+              <a:ext uri="{28A0092B-C50C-407E-A947-70E740481C1C}">
+                <a14:useLocalDpi xmlns:a14="http://schemas.microsoft.com/office/drawing/2010/main" val="0"/>
+              </a:ext>
+            </a:extLst>
+          </a:blip>
+          <a:stretch>
+            <a:fillRect/>
+          </a:stretch>
+        </p:blipFill>
+        <p:spPr>
+          <a:xfrm>
+            <a:off x="10668000" y="5554358"/>
+            <a:ext cx="1574627" cy="1349680"/>
+          </a:xfrm>
+          <a:prstGeom prst="rect">
+            <a:avLst/>
+          </a:prstGeom>
+        </p:spPr>
+      </p:pic>
+    </p:spTree>
+    <p:extLst>
+      <p:ext uri="{BB962C8B-B14F-4D97-AF65-F5344CB8AC3E}">
+        <p14:creationId xmlns:p14="http://schemas.microsoft.com/office/powerpoint/2010/main" val="978903507"/>
       </p:ext>
     </p:extLst>
   </p:cSld>
@@ -7126,8 +7758,8 @@
         </p:nvSpPr>
         <p:spPr>
           <a:xfrm>
-            <a:off x="3978111" y="1122362"/>
-            <a:ext cx="5571242" cy="4524315"/>
+            <a:off x="381000" y="2383207"/>
+            <a:ext cx="9903905" cy="954107"/>
           </a:xfrm>
           <a:prstGeom prst="rect">
             <a:avLst/>
@@ -7141,101 +7773,359 @@
           <a:lstStyle/>
           <a:p>
             <a:r>
-              <a:rPr lang="fr-FR" dirty="0" err="1"/>
-              <a:t>Ojectif</a:t>
-            </a:r>
-            <a:r>
-              <a:rPr lang="fr-FR" dirty="0"/>
-              <a:t> à </a:t>
-            </a:r>
-            <a:r>
-              <a:rPr lang="fr-FR" dirty="0" err="1"/>
-              <a:t>realisé</a:t>
-            </a:r>
-            <a:r>
-              <a:rPr lang="fr-FR" dirty="0"/>
-              <a:t> : JOUR 1 : </a:t>
-            </a:r>
-          </a:p>
-          <a:p>
-            <a:r>
-              <a:rPr lang="fr-FR" dirty="0"/>
-              <a:t>Mise en place d’une base de donnée</a:t>
-            </a:r>
-          </a:p>
-          <a:p>
-            <a:r>
-              <a:rPr lang="fr-FR" dirty="0"/>
-              <a:t>MCD / Merise</a:t>
+              <a:rPr lang="fr-FR" sz="2800" dirty="0"/>
+              <a:t>- </a:t>
+            </a:r>
+            <a:r>
+              <a:rPr lang="fr-FR" sz="2800" dirty="0" err="1"/>
+              <a:t>Database</a:t>
+            </a:r>
+            <a:r>
+              <a:rPr lang="fr-FR" sz="2800" dirty="0"/>
+              <a:t> avec les tables réalisé</a:t>
+            </a:r>
+          </a:p>
+          <a:p>
+            <a:r>
+              <a:rPr lang="fr-FR" sz="2800" dirty="0"/>
+              <a:t>- MCD / Merise </a:t>
+            </a:r>
+          </a:p>
+        </p:txBody>
+      </p:sp>
+      <p:sp>
+        <p:nvSpPr>
+          <p:cNvPr id="8" name="Rectangle 7">
+            <a:extLst>
+              <a:ext uri="{FF2B5EF4-FFF2-40B4-BE49-F238E27FC236}">
+                <a16:creationId xmlns:a16="http://schemas.microsoft.com/office/drawing/2014/main" id="{4C0ED370-6748-452A-8819-778C501D92DF}"/>
+              </a:ext>
+            </a:extLst>
+          </p:cNvPr>
+          <p:cNvSpPr/>
+          <p:nvPr/>
+        </p:nvSpPr>
+        <p:spPr>
+          <a:xfrm>
+            <a:off x="287079" y="135803"/>
+            <a:ext cx="3895725" cy="1140104"/>
+          </a:xfrm>
+          <a:prstGeom prst="rect">
+            <a:avLst/>
+          </a:prstGeom>
+          <a:solidFill>
+            <a:schemeClr val="tx1">
+              <a:lumMod val="95000"/>
+              <a:lumOff val="5000"/>
+            </a:schemeClr>
+          </a:solidFill>
+          <a:ln>
+            <a:solidFill>
+              <a:schemeClr val="tx1">
+                <a:lumMod val="85000"/>
+                <a:lumOff val="15000"/>
+              </a:schemeClr>
+            </a:solidFill>
+          </a:ln>
+          <a:effectLst/>
+          <a:scene3d>
+            <a:camera prst="orthographicFront">
+              <a:rot lat="0" lon="0" rev="0"/>
+            </a:camera>
+            <a:lightRig rig="chilly" dir="t">
+              <a:rot lat="0" lon="0" rev="18480000"/>
+            </a:lightRig>
+          </a:scene3d>
+          <a:sp3d prstMaterial="clear">
+            <a:bevelT h="63500"/>
+          </a:sp3d>
+        </p:spPr>
+        <p:style>
+          <a:lnRef idx="2">
+            <a:schemeClr val="accent1">
+              <a:shade val="50000"/>
+            </a:schemeClr>
+          </a:lnRef>
+          <a:fillRef idx="1">
+            <a:schemeClr val="accent1"/>
+          </a:fillRef>
+          <a:effectRef idx="0">
+            <a:schemeClr val="accent1"/>
+          </a:effectRef>
+          <a:fontRef idx="minor">
+            <a:schemeClr val="lt1"/>
+          </a:fontRef>
+        </p:style>
+        <p:txBody>
+          <a:bodyPr rtlCol="0" anchor="ctr"/>
+          <a:lstStyle/>
+          <a:p>
+            <a:pPr algn="ctr"/>
+            <a:r>
+              <a:rPr lang="fr-FR" sz="2800" b="1" dirty="0">
+                <a:solidFill>
+                  <a:schemeClr val="bg2">
+                    <a:lumMod val="25000"/>
+                  </a:schemeClr>
+                </a:solidFill>
+              </a:rPr>
+              <a:t>TACHES REALISEES          </a:t>
+            </a:r>
+          </a:p>
+          <a:p>
+            <a:pPr algn="ctr"/>
+            <a:r>
+              <a:rPr lang="fr-FR" sz="2800" b="1" dirty="0">
+                <a:solidFill>
+                  <a:schemeClr val="bg2">
+                    <a:lumMod val="25000"/>
+                  </a:schemeClr>
+                </a:solidFill>
+              </a:rPr>
+              <a:t>LE JOUR 1</a:t>
+            </a:r>
+          </a:p>
+        </p:txBody>
+      </p:sp>
+      <p:sp>
+        <p:nvSpPr>
+          <p:cNvPr id="4" name="ZoneTexte 3">
+            <a:extLst>
+              <a:ext uri="{FF2B5EF4-FFF2-40B4-BE49-F238E27FC236}">
+                <a16:creationId xmlns:a16="http://schemas.microsoft.com/office/drawing/2014/main" id="{4BF73A7A-D643-4483-B2E7-65BEE07ACFB8}"/>
+              </a:ext>
+            </a:extLst>
+          </p:cNvPr>
+          <p:cNvSpPr txBox="1"/>
+          <p:nvPr/>
+        </p:nvSpPr>
+        <p:spPr>
+          <a:xfrm>
+            <a:off x="181638" y="4395626"/>
+            <a:ext cx="11828721" cy="1569660"/>
+          </a:xfrm>
+          <a:prstGeom prst="rect">
+            <a:avLst/>
+          </a:prstGeom>
+          <a:noFill/>
+        </p:spPr>
+        <p:txBody>
+          <a:bodyPr wrap="square" rtlCol="0">
+            <a:spAutoFit/>
+          </a:bodyPr>
+          <a:lstStyle/>
+          <a:p>
+            <a:r>
+              <a:rPr lang="fr-FR" sz="2600" dirty="0"/>
+              <a:t>(Voir fichier croquis du site complet)</a:t>
+            </a:r>
+          </a:p>
+          <a:p>
+            <a:r>
+              <a:rPr lang="fr-FR" sz="2600" dirty="0"/>
+              <a:t>- Icon réalisé</a:t>
+            </a:r>
+          </a:p>
+          <a:p>
+            <a:r>
+              <a:rPr lang="fr-FR" sz="2600" dirty="0"/>
+              <a:t>- Image et présentation de chacun des produits récupéré </a:t>
             </a:r>
           </a:p>
           <a:p>
             <a:endParaRPr lang="fr-FR" dirty="0"/>
           </a:p>
-          <a:p>
-            <a:r>
-              <a:rPr lang="fr-FR" dirty="0"/>
-              <a:t>Croquis et structure du site internet</a:t>
+        </p:txBody>
+      </p:sp>
+      <p:sp>
+        <p:nvSpPr>
+          <p:cNvPr id="10" name="Rectangle : coins arrondis 9">
+            <a:extLst>
+              <a:ext uri="{FF2B5EF4-FFF2-40B4-BE49-F238E27FC236}">
+                <a16:creationId xmlns:a16="http://schemas.microsoft.com/office/drawing/2014/main" id="{01B418DB-4A5B-4A7C-892A-027DEF08F489}"/>
+              </a:ext>
+            </a:extLst>
+          </p:cNvPr>
+          <p:cNvSpPr/>
+          <p:nvPr/>
+        </p:nvSpPr>
+        <p:spPr>
+          <a:xfrm>
+            <a:off x="287079" y="1701281"/>
+            <a:ext cx="6713796" cy="597988"/>
+          </a:xfrm>
+          <a:prstGeom prst="roundRect">
+            <a:avLst/>
+          </a:prstGeom>
+          <a:solidFill>
+            <a:schemeClr val="bg2">
+              <a:lumMod val="90000"/>
+            </a:schemeClr>
+          </a:solidFill>
+          <a:ln>
+            <a:solidFill>
+              <a:schemeClr val="bg1">
+                <a:lumMod val="75000"/>
+              </a:schemeClr>
+            </a:solidFill>
+          </a:ln>
+        </p:spPr>
+        <p:style>
+          <a:lnRef idx="2">
+            <a:schemeClr val="accent1">
+              <a:shade val="50000"/>
+            </a:schemeClr>
+          </a:lnRef>
+          <a:fillRef idx="1">
+            <a:schemeClr val="accent1"/>
+          </a:fillRef>
+          <a:effectRef idx="0">
+            <a:schemeClr val="accent1"/>
+          </a:effectRef>
+          <a:fontRef idx="minor">
+            <a:schemeClr val="lt1"/>
+          </a:fontRef>
+        </p:style>
+        <p:txBody>
+          <a:bodyPr rtlCol="0" anchor="ctr"/>
+          <a:lstStyle/>
+          <a:p>
+            <a:pPr algn="ctr"/>
+            <a:endParaRPr lang="fr-FR"/>
+          </a:p>
+        </p:txBody>
+      </p:sp>
+      <p:sp>
+        <p:nvSpPr>
+          <p:cNvPr id="11" name="ZoneTexte 10">
+            <a:extLst>
+              <a:ext uri="{FF2B5EF4-FFF2-40B4-BE49-F238E27FC236}">
+                <a16:creationId xmlns:a16="http://schemas.microsoft.com/office/drawing/2014/main" id="{4F6769F6-DD94-4D1F-8DB2-0EFDC6FDC03E}"/>
+              </a:ext>
+            </a:extLst>
+          </p:cNvPr>
+          <p:cNvSpPr txBox="1"/>
+          <p:nvPr/>
+        </p:nvSpPr>
+        <p:spPr>
+          <a:xfrm>
+            <a:off x="381000" y="1701282"/>
+            <a:ext cx="5715000" cy="954107"/>
+          </a:xfrm>
+          <a:prstGeom prst="rect">
+            <a:avLst/>
+          </a:prstGeom>
+          <a:noFill/>
+        </p:spPr>
+        <p:txBody>
+          <a:bodyPr wrap="square" rtlCol="0">
+            <a:spAutoFit/>
+          </a:bodyPr>
+          <a:lstStyle/>
+          <a:p>
+            <a:r>
+              <a:rPr lang="fr-FR" sz="2800" dirty="0"/>
+              <a:t>Mise en place d'une base de donnée : </a:t>
+            </a:r>
+          </a:p>
+          <a:p>
+            <a:endParaRPr lang="fr-FR" sz="2800" dirty="0"/>
+          </a:p>
+        </p:txBody>
+      </p:sp>
+      <p:sp>
+        <p:nvSpPr>
+          <p:cNvPr id="14" name="Rectangle : coins arrondis 13">
+            <a:extLst>
+              <a:ext uri="{FF2B5EF4-FFF2-40B4-BE49-F238E27FC236}">
+                <a16:creationId xmlns:a16="http://schemas.microsoft.com/office/drawing/2014/main" id="{49EB4802-E9E5-439C-B63F-E1CDF0E5CC08}"/>
+              </a:ext>
+            </a:extLst>
+          </p:cNvPr>
+          <p:cNvSpPr/>
+          <p:nvPr/>
+        </p:nvSpPr>
+        <p:spPr>
+          <a:xfrm>
+            <a:off x="287078" y="3520687"/>
+            <a:ext cx="6713796" cy="597988"/>
+          </a:xfrm>
+          <a:prstGeom prst="roundRect">
+            <a:avLst/>
+          </a:prstGeom>
+          <a:solidFill>
+            <a:schemeClr val="bg2">
+              <a:lumMod val="90000"/>
+            </a:schemeClr>
+          </a:solidFill>
+          <a:ln>
+            <a:solidFill>
+              <a:schemeClr val="bg1">
+                <a:lumMod val="75000"/>
+              </a:schemeClr>
+            </a:solidFill>
+          </a:ln>
+        </p:spPr>
+        <p:style>
+          <a:lnRef idx="2">
+            <a:schemeClr val="accent1">
+              <a:shade val="50000"/>
+            </a:schemeClr>
+          </a:lnRef>
+          <a:fillRef idx="1">
+            <a:schemeClr val="accent1"/>
+          </a:fillRef>
+          <a:effectRef idx="0">
+            <a:schemeClr val="accent1"/>
+          </a:effectRef>
+          <a:fontRef idx="minor">
+            <a:schemeClr val="lt1"/>
+          </a:fontRef>
+        </p:style>
+        <p:txBody>
+          <a:bodyPr rtlCol="0" anchor="ctr"/>
+          <a:lstStyle/>
+          <a:p>
+            <a:pPr algn="ctr"/>
+            <a:endParaRPr lang="fr-FR"/>
+          </a:p>
+        </p:txBody>
+      </p:sp>
+      <p:sp>
+        <p:nvSpPr>
+          <p:cNvPr id="13" name="ZoneTexte 12">
+            <a:extLst>
+              <a:ext uri="{FF2B5EF4-FFF2-40B4-BE49-F238E27FC236}">
+                <a16:creationId xmlns:a16="http://schemas.microsoft.com/office/drawing/2014/main" id="{C6389C57-5DA0-4BF3-B171-99F2E9FB9D6E}"/>
+              </a:ext>
+            </a:extLst>
+          </p:cNvPr>
+          <p:cNvSpPr txBox="1"/>
+          <p:nvPr/>
+        </p:nvSpPr>
+        <p:spPr>
+          <a:xfrm>
+            <a:off x="227878" y="3563921"/>
+            <a:ext cx="6832195" cy="800219"/>
+          </a:xfrm>
+          <a:prstGeom prst="rect">
+            <a:avLst/>
+          </a:prstGeom>
+          <a:noFill/>
+        </p:spPr>
+        <p:txBody>
+          <a:bodyPr wrap="square" rtlCol="0">
+            <a:spAutoFit/>
+          </a:bodyPr>
+          <a:lstStyle/>
+          <a:p>
+            <a:r>
+              <a:rPr lang="fr-FR" sz="2800" dirty="0"/>
+              <a:t>Mise en place de la structure du site internet :  </a:t>
             </a:r>
           </a:p>
           <a:p>
             <a:endParaRPr lang="fr-FR" dirty="0"/>
-          </a:p>
-          <a:p>
-            <a:r>
-              <a:rPr lang="fr-FR" dirty="0"/>
-              <a:t>Objectif réalisé  JOUR 1  :</a:t>
-            </a:r>
-          </a:p>
-          <a:p>
-            <a:endParaRPr lang="fr-FR" dirty="0"/>
-          </a:p>
-          <a:p>
-            <a:r>
-              <a:rPr lang="fr-FR" dirty="0"/>
-              <a:t>- Mise en place d'une base de donnée : </a:t>
-            </a:r>
-          </a:p>
-          <a:p>
-            <a:r>
-              <a:rPr lang="fr-FR" dirty="0"/>
-              <a:t>- </a:t>
-            </a:r>
-            <a:r>
-              <a:rPr lang="fr-FR" dirty="0" err="1"/>
-              <a:t>Database</a:t>
-            </a:r>
-            <a:r>
-              <a:rPr lang="fr-FR" dirty="0"/>
-              <a:t> avec les tables réalisé</a:t>
-            </a:r>
-          </a:p>
-          <a:p>
-            <a:r>
-              <a:rPr lang="fr-FR" dirty="0"/>
-              <a:t>- MCD / Merise </a:t>
-            </a:r>
-          </a:p>
-          <a:p>
-            <a:endParaRPr lang="fr-FR" dirty="0"/>
-          </a:p>
-          <a:p>
-            <a:r>
-              <a:rPr lang="fr-FR" dirty="0"/>
-              <a:t>- Mise en place de la structure du site internet :  (Voir fichier croquis du site complet)</a:t>
-            </a:r>
-          </a:p>
-          <a:p>
-            <a:r>
-              <a:rPr lang="fr-FR" dirty="0"/>
-              <a:t>- Icon réalisé</a:t>
-            </a:r>
-          </a:p>
-          <a:p>
-            <a:r>
-              <a:rPr lang="fr-FR" dirty="0"/>
-              <a:t>- Image et présentation de chacun des produits récupéré </a:t>
-            </a:r>
           </a:p>
         </p:txBody>
       </p:sp>

</xml_diff>

<commit_message>
camille - MAJ DIAPO - TERMINER
MAJ DES TEST UNITAIRE
</commit_message>
<xml_diff>
--- a/Présentation UPOP.pptx
+++ b/Présentation UPOP.pptx
@@ -13208,41 +13208,6 @@
       </p:grpSpPr>
       <p:sp>
         <p:nvSpPr>
-          <p:cNvPr id="5" name="ZoneTexte 4">
-            <a:extLst>
-              <a:ext uri="{FF2B5EF4-FFF2-40B4-BE49-F238E27FC236}">
-                <a16:creationId xmlns:a16="http://schemas.microsoft.com/office/drawing/2014/main" id="{BB5C9A76-BDA7-43EB-B77A-D3D4F7CE3552}"/>
-              </a:ext>
-            </a:extLst>
-          </p:cNvPr>
-          <p:cNvSpPr txBox="1"/>
-          <p:nvPr/>
-        </p:nvSpPr>
-        <p:spPr>
-          <a:xfrm>
-            <a:off x="2874608" y="1077039"/>
-            <a:ext cx="5029200" cy="646331"/>
-          </a:xfrm>
-          <a:prstGeom prst="rect">
-            <a:avLst/>
-          </a:prstGeom>
-          <a:noFill/>
-        </p:spPr>
-        <p:txBody>
-          <a:bodyPr wrap="square" rtlCol="0">
-            <a:spAutoFit/>
-          </a:bodyPr>
-          <a:lstStyle/>
-          <a:p>
-            <a:r>
-              <a:rPr lang="fr-FR" sz="3600" dirty="0"/>
-              <a:t>PAGE INDEX :</a:t>
-            </a:r>
-          </a:p>
-        </p:txBody>
-      </p:sp>
-      <p:sp>
-        <p:nvSpPr>
           <p:cNvPr id="6" name="ZoneTexte 5">
             <a:extLst>
               <a:ext uri="{FF2B5EF4-FFF2-40B4-BE49-F238E27FC236}">
@@ -13255,8 +13220,8 @@
         </p:nvSpPr>
         <p:spPr>
           <a:xfrm>
-            <a:off x="2743200" y="1794063"/>
-            <a:ext cx="7581900" cy="4770537"/>
+            <a:off x="2781300" y="1991129"/>
+            <a:ext cx="7581900" cy="4585871"/>
           </a:xfrm>
           <a:prstGeom prst="rect">
             <a:avLst/>
@@ -13348,7 +13313,14 @@
             </a:r>
           </a:p>
           <a:p>
-            <a:endParaRPr lang="fr-FR" sz="3200" dirty="0"/>
+            <a:pPr marL="457200" indent="-457200">
+              <a:buFontTx/>
+              <a:buChar char="-"/>
+            </a:pPr>
+            <a:r>
+              <a:rPr lang="fr-FR" sz="2800" dirty="0"/>
+              <a:t>Format e-mail</a:t>
+            </a:r>
           </a:p>
         </p:txBody>
       </p:sp>
@@ -13431,6 +13403,69 @@
           </a:p>
         </p:txBody>
       </p:sp>
+      <p:sp>
+        <p:nvSpPr>
+          <p:cNvPr id="9" name="Rectangle : coins arrondis 8">
+            <a:extLst>
+              <a:ext uri="{FF2B5EF4-FFF2-40B4-BE49-F238E27FC236}">
+                <a16:creationId xmlns:a16="http://schemas.microsoft.com/office/drawing/2014/main" id="{930E92D7-56FF-418B-877C-90624EBAC0C6}"/>
+              </a:ext>
+            </a:extLst>
+          </p:cNvPr>
+          <p:cNvSpPr/>
+          <p:nvPr/>
+        </p:nvSpPr>
+        <p:spPr>
+          <a:xfrm>
+            <a:off x="1905680" y="974798"/>
+            <a:ext cx="6364054" cy="819265"/>
+          </a:xfrm>
+          <a:prstGeom prst="roundRect">
+            <a:avLst/>
+          </a:prstGeom>
+          <a:solidFill>
+            <a:schemeClr val="bg2">
+              <a:lumMod val="90000"/>
+            </a:schemeClr>
+          </a:solidFill>
+          <a:ln>
+            <a:solidFill>
+              <a:schemeClr val="bg1">
+                <a:lumMod val="75000"/>
+              </a:schemeClr>
+            </a:solidFill>
+          </a:ln>
+        </p:spPr>
+        <p:style>
+          <a:lnRef idx="2">
+            <a:schemeClr val="accent1">
+              <a:shade val="50000"/>
+            </a:schemeClr>
+          </a:lnRef>
+          <a:fillRef idx="1">
+            <a:schemeClr val="accent1"/>
+          </a:fillRef>
+          <a:effectRef idx="0">
+            <a:schemeClr val="accent1"/>
+          </a:effectRef>
+          <a:fontRef idx="minor">
+            <a:schemeClr val="lt1"/>
+          </a:fontRef>
+        </p:style>
+        <p:txBody>
+          <a:bodyPr rtlCol="0" anchor="ctr"/>
+          <a:lstStyle/>
+          <a:p>
+            <a:pPr algn="ctr"/>
+            <a:r>
+              <a:rPr lang="fr-FR" sz="3600" dirty="0">
+                <a:latin typeface="+mj-lt"/>
+              </a:rPr>
+              <a:t>PAGE INDEX</a:t>
+            </a:r>
+          </a:p>
+        </p:txBody>
+      </p:sp>
     </p:spTree>
     <p:extLst>
       <p:ext uri="{BB962C8B-B14F-4D97-AF65-F5344CB8AC3E}">
@@ -13461,41 +13496,6 @@
           <a:chExt cx="0" cy="0"/>
         </a:xfrm>
       </p:grpSpPr>
-      <p:sp>
-        <p:nvSpPr>
-          <p:cNvPr id="4" name="ZoneTexte 3">
-            <a:extLst>
-              <a:ext uri="{FF2B5EF4-FFF2-40B4-BE49-F238E27FC236}">
-                <a16:creationId xmlns:a16="http://schemas.microsoft.com/office/drawing/2014/main" id="{8323A2E3-4281-4733-88CA-72488064597A}"/>
-              </a:ext>
-            </a:extLst>
-          </p:cNvPr>
-          <p:cNvSpPr txBox="1"/>
-          <p:nvPr/>
-        </p:nvSpPr>
-        <p:spPr>
-          <a:xfrm>
-            <a:off x="3240534" y="1450410"/>
-            <a:ext cx="5029200" cy="646331"/>
-          </a:xfrm>
-          <a:prstGeom prst="rect">
-            <a:avLst/>
-          </a:prstGeom>
-          <a:noFill/>
-        </p:spPr>
-        <p:txBody>
-          <a:bodyPr wrap="square" rtlCol="0">
-            <a:spAutoFit/>
-          </a:bodyPr>
-          <a:lstStyle/>
-          <a:p>
-            <a:r>
-              <a:rPr lang="fr-FR" sz="3600" dirty="0"/>
-              <a:t>PAGE CONTACT :</a:t>
-            </a:r>
-          </a:p>
-        </p:txBody>
-      </p:sp>
       <p:sp>
         <p:nvSpPr>
           <p:cNvPr id="5" name="ZoneTexte 4">
@@ -13650,6 +13650,69 @@
                 </a:effectLst>
               </a:rPr>
               <a:t>TEST UNITAIRE</a:t>
+            </a:r>
+          </a:p>
+        </p:txBody>
+      </p:sp>
+      <p:sp>
+        <p:nvSpPr>
+          <p:cNvPr id="6" name="Rectangle : coins arrondis 5">
+            <a:extLst>
+              <a:ext uri="{FF2B5EF4-FFF2-40B4-BE49-F238E27FC236}">
+                <a16:creationId xmlns:a16="http://schemas.microsoft.com/office/drawing/2014/main" id="{7018FB30-60EF-4E43-AB34-117DEE842CAD}"/>
+              </a:ext>
+            </a:extLst>
+          </p:cNvPr>
+          <p:cNvSpPr/>
+          <p:nvPr/>
+        </p:nvSpPr>
+        <p:spPr>
+          <a:xfrm>
+            <a:off x="2294172" y="1292892"/>
+            <a:ext cx="6364054" cy="819265"/>
+          </a:xfrm>
+          <a:prstGeom prst="roundRect">
+            <a:avLst/>
+          </a:prstGeom>
+          <a:solidFill>
+            <a:schemeClr val="bg2">
+              <a:lumMod val="90000"/>
+            </a:schemeClr>
+          </a:solidFill>
+          <a:ln>
+            <a:solidFill>
+              <a:schemeClr val="bg1">
+                <a:lumMod val="75000"/>
+              </a:schemeClr>
+            </a:solidFill>
+          </a:ln>
+        </p:spPr>
+        <p:style>
+          <a:lnRef idx="2">
+            <a:schemeClr val="accent1">
+              <a:shade val="50000"/>
+            </a:schemeClr>
+          </a:lnRef>
+          <a:fillRef idx="1">
+            <a:schemeClr val="accent1"/>
+          </a:fillRef>
+          <a:effectRef idx="0">
+            <a:schemeClr val="accent1"/>
+          </a:effectRef>
+          <a:fontRef idx="minor">
+            <a:schemeClr val="lt1"/>
+          </a:fontRef>
+        </p:style>
+        <p:txBody>
+          <a:bodyPr rtlCol="0" anchor="ctr"/>
+          <a:lstStyle/>
+          <a:p>
+            <a:pPr algn="ctr"/>
+            <a:r>
+              <a:rPr lang="fr-FR" sz="3600" dirty="0">
+                <a:latin typeface="+mj-lt"/>
+              </a:rPr>
+              <a:t>PAGE CONTACT</a:t>
             </a:r>
           </a:p>
         </p:txBody>
@@ -13765,41 +13828,6 @@
       </p:sp>
       <p:sp>
         <p:nvSpPr>
-          <p:cNvPr id="5" name="ZoneTexte 4">
-            <a:extLst>
-              <a:ext uri="{FF2B5EF4-FFF2-40B4-BE49-F238E27FC236}">
-                <a16:creationId xmlns:a16="http://schemas.microsoft.com/office/drawing/2014/main" id="{0DE56B4E-5EA6-46C0-8647-8F68411D503D}"/>
-              </a:ext>
-            </a:extLst>
-          </p:cNvPr>
-          <p:cNvSpPr txBox="1"/>
-          <p:nvPr/>
-        </p:nvSpPr>
-        <p:spPr>
-          <a:xfrm>
-            <a:off x="3405187" y="1480661"/>
-            <a:ext cx="5029200" cy="646331"/>
-          </a:xfrm>
-          <a:prstGeom prst="rect">
-            <a:avLst/>
-          </a:prstGeom>
-          <a:noFill/>
-        </p:spPr>
-        <p:txBody>
-          <a:bodyPr wrap="square" rtlCol="0">
-            <a:spAutoFit/>
-          </a:bodyPr>
-          <a:lstStyle/>
-          <a:p>
-            <a:r>
-              <a:rPr lang="fr-FR" sz="3600" dirty="0"/>
-              <a:t>PAGE COMPTE</a:t>
-            </a:r>
-          </a:p>
-        </p:txBody>
-      </p:sp>
-      <p:sp>
-        <p:nvSpPr>
           <p:cNvPr id="2" name="ZoneTexte 1">
             <a:extLst>
               <a:ext uri="{FF2B5EF4-FFF2-40B4-BE49-F238E27FC236}">
@@ -13812,8 +13840,8 @@
         </p:nvSpPr>
         <p:spPr>
           <a:xfrm>
-            <a:off x="3552824" y="2573119"/>
-            <a:ext cx="3667125" cy="646331"/>
+            <a:off x="2717006" y="2293786"/>
+            <a:ext cx="6757988" cy="954107"/>
           </a:xfrm>
           <a:prstGeom prst="rect">
             <a:avLst/>
@@ -13826,13 +13854,87 @@
           </a:bodyPr>
           <a:lstStyle/>
           <a:p>
-            <a:r>
-              <a:rPr lang="fr-FR" dirty="0"/>
-              <a:t>INFOS PERSO (JC)</a:t>
-            </a:r>
-          </a:p>
-          <a:p>
-            <a:endParaRPr lang="fr-FR" dirty="0"/>
+            <a:pPr marL="457200" indent="-457200">
+              <a:buFontTx/>
+              <a:buChar char="-"/>
+            </a:pPr>
+            <a:r>
+              <a:rPr lang="fr-FR" sz="2800" dirty="0"/>
+              <a:t>Comparaison des mots de passe</a:t>
+            </a:r>
+          </a:p>
+          <a:p>
+            <a:pPr marL="457200" indent="-457200">
+              <a:buFontTx/>
+              <a:buChar char="-"/>
+            </a:pPr>
+            <a:r>
+              <a:rPr lang="fr-FR" sz="2800" dirty="0"/>
+              <a:t>Format e-mail</a:t>
+            </a:r>
+          </a:p>
+        </p:txBody>
+      </p:sp>
+      <p:sp>
+        <p:nvSpPr>
+          <p:cNvPr id="6" name="Rectangle : coins arrondis 5">
+            <a:extLst>
+              <a:ext uri="{FF2B5EF4-FFF2-40B4-BE49-F238E27FC236}">
+                <a16:creationId xmlns:a16="http://schemas.microsoft.com/office/drawing/2014/main" id="{29B4FD19-FE8A-44CB-B96E-88B08CD819FB}"/>
+              </a:ext>
+            </a:extLst>
+          </p:cNvPr>
+          <p:cNvSpPr/>
+          <p:nvPr/>
+        </p:nvSpPr>
+        <p:spPr>
+          <a:xfrm>
+            <a:off x="2294172" y="1292892"/>
+            <a:ext cx="6364054" cy="819265"/>
+          </a:xfrm>
+          <a:prstGeom prst="roundRect">
+            <a:avLst/>
+          </a:prstGeom>
+          <a:solidFill>
+            <a:schemeClr val="bg2">
+              <a:lumMod val="90000"/>
+            </a:schemeClr>
+          </a:solidFill>
+          <a:ln>
+            <a:solidFill>
+              <a:schemeClr val="bg1">
+                <a:lumMod val="75000"/>
+              </a:schemeClr>
+            </a:solidFill>
+          </a:ln>
+        </p:spPr>
+        <p:style>
+          <a:lnRef idx="2">
+            <a:schemeClr val="accent1">
+              <a:shade val="50000"/>
+            </a:schemeClr>
+          </a:lnRef>
+          <a:fillRef idx="1">
+            <a:schemeClr val="accent1"/>
+          </a:fillRef>
+          <a:effectRef idx="0">
+            <a:schemeClr val="accent1"/>
+          </a:effectRef>
+          <a:fontRef idx="minor">
+            <a:schemeClr val="lt1"/>
+          </a:fontRef>
+        </p:style>
+        <p:txBody>
+          <a:bodyPr rtlCol="0" anchor="ctr"/>
+          <a:lstStyle/>
+          <a:p>
+            <a:pPr algn="ctr"/>
+            <a:r>
+              <a:rPr lang="fr-FR" sz="3600" dirty="0">
+                <a:latin typeface="+mj-lt"/>
+              </a:rPr>
+              <a:t>PAGE COMPTE</a:t>
+            </a:r>
           </a:p>
         </p:txBody>
       </p:sp>
@@ -13904,41 +14006,6 @@
       </p:pic>
       <p:sp>
         <p:nvSpPr>
-          <p:cNvPr id="5" name="ZoneTexte 4">
-            <a:extLst>
-              <a:ext uri="{FF2B5EF4-FFF2-40B4-BE49-F238E27FC236}">
-                <a16:creationId xmlns:a16="http://schemas.microsoft.com/office/drawing/2014/main" id="{0DE56B4E-5EA6-46C0-8647-8F68411D503D}"/>
-              </a:ext>
-            </a:extLst>
-          </p:cNvPr>
-          <p:cNvSpPr txBox="1"/>
-          <p:nvPr/>
-        </p:nvSpPr>
-        <p:spPr>
-          <a:xfrm>
-            <a:off x="3381375" y="1802368"/>
-            <a:ext cx="5029200" cy="646331"/>
-          </a:xfrm>
-          <a:prstGeom prst="rect">
-            <a:avLst/>
-          </a:prstGeom>
-          <a:noFill/>
-        </p:spPr>
-        <p:txBody>
-          <a:bodyPr wrap="square" rtlCol="0">
-            <a:spAutoFit/>
-          </a:bodyPr>
-          <a:lstStyle/>
-          <a:p>
-            <a:r>
-              <a:rPr lang="fr-FR" sz="3600" dirty="0"/>
-              <a:t>PAGE PANIER</a:t>
-            </a:r>
-          </a:p>
-        </p:txBody>
-      </p:sp>
-      <p:sp>
-        <p:nvSpPr>
           <p:cNvPr id="2" name="ZoneTexte 1">
             <a:extLst>
               <a:ext uri="{FF2B5EF4-FFF2-40B4-BE49-F238E27FC236}">
@@ -13951,7 +14018,7 @@
         </p:nvSpPr>
         <p:spPr>
           <a:xfrm>
-            <a:off x="3381375" y="2628900"/>
+            <a:off x="3019425" y="2493405"/>
             <a:ext cx="5095875" cy="830997"/>
           </a:xfrm>
           <a:prstGeom prst="rect">
@@ -13967,7 +14034,7 @@
           <a:p>
             <a:r>
               <a:rPr lang="fr-FR" sz="2400" dirty="0"/>
-              <a:t>Si commande en cours :</a:t>
+              <a:t>- Si commande en cours :</a:t>
             </a:r>
           </a:p>
           <a:p>
@@ -14017,6 +14084,69 @@
                 </a:effectLst>
               </a:rPr>
               <a:t>TEST UNITAIRE</a:t>
+            </a:r>
+          </a:p>
+        </p:txBody>
+      </p:sp>
+      <p:sp>
+        <p:nvSpPr>
+          <p:cNvPr id="7" name="Rectangle : coins arrondis 6">
+            <a:extLst>
+              <a:ext uri="{FF2B5EF4-FFF2-40B4-BE49-F238E27FC236}">
+                <a16:creationId xmlns:a16="http://schemas.microsoft.com/office/drawing/2014/main" id="{7EE02B64-2954-4269-8C27-6C3F084A3942}"/>
+              </a:ext>
+            </a:extLst>
+          </p:cNvPr>
+          <p:cNvSpPr/>
+          <p:nvPr/>
+        </p:nvSpPr>
+        <p:spPr>
+          <a:xfrm>
+            <a:off x="2294172" y="1292892"/>
+            <a:ext cx="6364054" cy="819265"/>
+          </a:xfrm>
+          <a:prstGeom prst="roundRect">
+            <a:avLst/>
+          </a:prstGeom>
+          <a:solidFill>
+            <a:schemeClr val="bg2">
+              <a:lumMod val="90000"/>
+            </a:schemeClr>
+          </a:solidFill>
+          <a:ln>
+            <a:solidFill>
+              <a:schemeClr val="bg1">
+                <a:lumMod val="75000"/>
+              </a:schemeClr>
+            </a:solidFill>
+          </a:ln>
+        </p:spPr>
+        <p:style>
+          <a:lnRef idx="2">
+            <a:schemeClr val="accent1">
+              <a:shade val="50000"/>
+            </a:schemeClr>
+          </a:lnRef>
+          <a:fillRef idx="1">
+            <a:schemeClr val="accent1"/>
+          </a:fillRef>
+          <a:effectRef idx="0">
+            <a:schemeClr val="accent1"/>
+          </a:effectRef>
+          <a:fontRef idx="minor">
+            <a:schemeClr val="lt1"/>
+          </a:fontRef>
+        </p:style>
+        <p:txBody>
+          <a:bodyPr rtlCol="0" anchor="ctr"/>
+          <a:lstStyle/>
+          <a:p>
+            <a:pPr algn="ctr"/>
+            <a:r>
+              <a:rPr lang="fr-FR" sz="3600" dirty="0">
+                <a:latin typeface="+mj-lt"/>
+              </a:rPr>
+              <a:t>PAGE PANIER</a:t>
             </a:r>
           </a:p>
         </p:txBody>

</xml_diff>

<commit_message>
Camille MAJ - Ajout test unitaire connexion
 Ajout test unitaire connexion
</commit_message>
<xml_diff>
--- a/Présentation UPOP.pptx
+++ b/Présentation UPOP.pptx
@@ -13221,7 +13221,7 @@
         <p:spPr>
           <a:xfrm>
             <a:off x="2781300" y="1991129"/>
-            <a:ext cx="7581900" cy="4585871"/>
+            <a:ext cx="7581900" cy="4801314"/>
           </a:xfrm>
           <a:prstGeom prst="rect">
             <a:avLst/>
@@ -13284,7 +13284,7 @@
               <a:buFontTx/>
               <a:buChar char="-"/>
             </a:pPr>
-            <a:endParaRPr lang="fr-FR" sz="3200" dirty="0"/>
+            <a:endParaRPr lang="fr-FR" dirty="0"/>
           </a:p>
           <a:p>
             <a:r>
@@ -13320,6 +13320,16 @@
             <a:r>
               <a:rPr lang="fr-FR" sz="2800" dirty="0"/>
               <a:t>Format e-mail</a:t>
+            </a:r>
+          </a:p>
+          <a:p>
+            <a:pPr marL="457200" indent="-457200">
+              <a:buFontTx/>
+              <a:buChar char="-"/>
+            </a:pPr>
+            <a:r>
+              <a:rPr lang="fr-FR" sz="2800" dirty="0"/>
+              <a:t>Gestion de validation d’inscription</a:t>
             </a:r>
           </a:p>
         </p:txBody>

</xml_diff>

<commit_message>
camille MAJ tableau diapo
</commit_message>
<xml_diff>
--- a/Présentation UPOP.pptx
+++ b/Présentation UPOP.pptx
@@ -6942,7 +6942,7 @@
           <p:nvPr>
             <p:extLst>
               <p:ext uri="{D42A27DB-BD31-4B8C-83A1-F6EECF244321}">
-                <p14:modId xmlns:p14="http://schemas.microsoft.com/office/powerpoint/2010/main" val="2109109695"/>
+                <p14:modId xmlns:p14="http://schemas.microsoft.com/office/powerpoint/2010/main" val="341365432"/>
               </p:ext>
             </p:extLst>
           </p:nvPr>
@@ -7275,7 +7275,7 @@
                           <a:effectLst/>
                           <a:latin typeface="+mn-lt"/>
                         </a:rPr>
-                        <a:t>1h </a:t>
+                        <a:t>10h </a:t>
                       </a:r>
                       <a:endParaRPr lang="fr-FR" sz="2000" b="1" i="0" u="none" strike="noStrike" dirty="0">
                         <a:solidFill>
@@ -7368,7 +7368,7 @@
                           <a:effectLst/>
                           <a:latin typeface="+mn-lt"/>
                         </a:rPr>
-                        <a:t>13h</a:t>
+                        <a:t>6h</a:t>
                       </a:r>
                       <a:endParaRPr lang="fr-FR" sz="2000" b="1" i="0" u="none" strike="noStrike" dirty="0">
                         <a:solidFill>
@@ -7399,7 +7399,7 @@
                           <a:effectLst/>
                           <a:latin typeface="+mn-lt"/>
                         </a:rPr>
-                        <a:t>0h</a:t>
+                        <a:t>3h</a:t>
                       </a:r>
                       <a:endParaRPr lang="fr-FR" sz="2000" b="1" i="0" u="none" strike="noStrike" dirty="0">
                         <a:solidFill>
@@ -7430,7 +7430,7 @@
                           <a:effectLst/>
                           <a:latin typeface="+mn-lt"/>
                         </a:rPr>
-                        <a:t>4h</a:t>
+                        <a:t>2h</a:t>
                       </a:r>
                       <a:endParaRPr lang="fr-FR" sz="2000" b="1" i="0" u="none" strike="noStrike" dirty="0">
                         <a:solidFill>
@@ -7499,7 +7499,7 @@
                           <a:effectLst/>
                           <a:latin typeface="+mn-lt"/>
                         </a:rPr>
-                        <a:t>16h</a:t>
+                        <a:t>12h</a:t>
                       </a:r>
                       <a:endParaRPr lang="fr-FR" sz="2000" b="1" i="0" u="none" strike="noStrike" dirty="0">
                         <a:solidFill>
@@ -7554,7 +7554,7 @@
                           <a:effectLst/>
                           <a:latin typeface="+mn-lt"/>
                         </a:rPr>
-                        <a:t>0h</a:t>
+                        <a:t>5h</a:t>
                       </a:r>
                       <a:endParaRPr lang="fr-FR" sz="2000" b="1" i="0" u="none" strike="noStrike" dirty="0">
                         <a:solidFill>
@@ -7585,7 +7585,7 @@
                           <a:effectLst/>
                           <a:latin typeface="+mn-lt"/>
                         </a:rPr>
-                        <a:t>10h</a:t>
+                        <a:t>3h</a:t>
                       </a:r>
                       <a:endParaRPr lang="fr-FR" sz="2000" b="1" i="0" u="none" strike="noStrike" dirty="0">
                         <a:solidFill>
@@ -7647,7 +7647,7 @@
                           <a:effectLst/>
                           <a:latin typeface="+mn-lt"/>
                         </a:rPr>
-                        <a:t>3h</a:t>
+                        <a:t>2h</a:t>
                       </a:r>
                       <a:endParaRPr lang="fr-FR" sz="2000" b="1" i="0" u="none" strike="noStrike" dirty="0">
                         <a:solidFill>
@@ -7778,7 +7778,7 @@
                           <a:effectLst/>
                           <a:latin typeface="+mn-lt"/>
                         </a:rPr>
-                        <a:t>15h</a:t>
+                        <a:t>7h</a:t>
                       </a:r>
                       <a:endParaRPr lang="fr-FR" sz="2000" b="1" i="0" u="none" strike="noStrike" dirty="0">
                         <a:solidFill>
@@ -7840,7 +7840,7 @@
                           <a:effectLst/>
                           <a:latin typeface="+mn-lt"/>
                         </a:rPr>
-                        <a:t>12h</a:t>
+                        <a:t>9h</a:t>
                       </a:r>
                       <a:endParaRPr lang="fr-FR" sz="2000" b="1" i="0" u="none" strike="noStrike" dirty="0">
                         <a:solidFill>
@@ -8102,7 +8102,7 @@
                           <a:effectLst/>
                           <a:latin typeface="+mn-lt"/>
                         </a:rPr>
-                        <a:t>5h</a:t>
+                        <a:t>2h</a:t>
                       </a:r>
                       <a:endParaRPr lang="fr-FR" sz="2000" b="1" i="0" u="none" strike="noStrike" dirty="0">
                         <a:solidFill>
@@ -8167,19 +8167,15 @@
                     <a:p>
                       <a:pPr algn="ctr" fontAlgn="ctr"/>
                       <a:r>
-                        <a:rPr lang="fr-FR" sz="2000" b="1" u="none" strike="noStrike" dirty="0">
+                        <a:rPr lang="fr-FR" sz="2000" b="1" i="0" u="none" strike="noStrike" dirty="0">
+                          <a:solidFill>
+                            <a:srgbClr val="000000"/>
+                          </a:solidFill>
                           <a:effectLst/>
                           <a:latin typeface="+mn-lt"/>
                         </a:rPr>
-                        <a:t>0h</a:t>
+                        <a:t>2h</a:t>
                       </a:r>
-                      <a:endParaRPr lang="fr-FR" sz="2000" b="1" i="0" u="none" strike="noStrike" dirty="0">
-                        <a:solidFill>
-                          <a:srgbClr val="000000"/>
-                        </a:solidFill>
-                        <a:effectLst/>
-                        <a:latin typeface="+mn-lt"/>
-                      </a:endParaRPr>
                     </a:p>
                   </a:txBody>
                   <a:tcPr marL="6350" marR="6350" marT="6350" marB="0" anchor="ctr">
@@ -8233,7 +8229,7 @@
                           <a:effectLst/>
                           <a:latin typeface="+mn-lt"/>
                         </a:rPr>
-                        <a:t>9h</a:t>
+                        <a:t>10h</a:t>
                       </a:r>
                       <a:endParaRPr lang="fr-FR" sz="2000" b="1" i="0" u="none" strike="noStrike" dirty="0">
                         <a:solidFill>
@@ -8264,7 +8260,7 @@
                           <a:effectLst/>
                           <a:latin typeface="+mn-lt"/>
                         </a:rPr>
-                        <a:t>4h</a:t>
+                        <a:t>16h</a:t>
                       </a:r>
                       <a:endParaRPr lang="fr-FR" sz="2000" b="1" i="0" u="none" strike="noStrike" dirty="0">
                         <a:solidFill>
@@ -8326,7 +8322,7 @@
                           <a:effectLst/>
                           <a:latin typeface="+mn-lt"/>
                         </a:rPr>
-                        <a:t>6h</a:t>
+                        <a:t>12h</a:t>
                       </a:r>
                       <a:endParaRPr lang="fr-FR" sz="2000" b="1" i="0" u="none" strike="noStrike" dirty="0">
                         <a:solidFill>
@@ -8395,7 +8391,7 @@
                           <a:effectLst/>
                           <a:latin typeface="+mn-lt"/>
                         </a:rPr>
-                        <a:t>0h</a:t>
+                        <a:t>3h</a:t>
                       </a:r>
                       <a:endParaRPr lang="fr-FR" sz="2000" b="1" i="0" u="none" strike="noStrike" dirty="0">
                         <a:solidFill>
@@ -8457,7 +8453,7 @@
                           <a:effectLst/>
                           <a:latin typeface="+mn-lt"/>
                         </a:rPr>
-                        <a:t>7h</a:t>
+                        <a:t>9h</a:t>
                       </a:r>
                       <a:endParaRPr lang="fr-FR" sz="2000" b="1" i="0" u="none" strike="noStrike" dirty="0">
                         <a:solidFill>
@@ -8488,7 +8484,7 @@
                           <a:effectLst/>
                           <a:latin typeface="+mn-lt"/>
                         </a:rPr>
-                        <a:t>6h</a:t>
+                        <a:t>8h</a:t>
                       </a:r>
                       <a:endParaRPr lang="fr-FR" sz="2000" b="1" i="0" u="none" strike="noStrike" dirty="0">
                         <a:solidFill>
@@ -11044,15 +11040,7 @@
           <a:p>
             <a:r>
               <a:rPr lang="fr-FR" sz="2200" dirty="0"/>
-              <a:t>.Visualisation des </a:t>
-            </a:r>
-            <a:r>
-              <a:rPr lang="fr-FR" sz="2200" dirty="0" err="1"/>
-              <a:t>nouveautées</a:t>
-            </a:r>
-            <a:r>
-              <a:rPr lang="fr-FR" sz="2200" dirty="0"/>
-              <a:t> en page d’accueil</a:t>
+              <a:t>.Visualisation des nouveautés en page d’accueil</a:t>
             </a:r>
           </a:p>
           <a:p>
@@ -13054,8 +13042,8 @@
         </p:nvSpPr>
         <p:spPr>
           <a:xfrm rot="15663506">
-            <a:off x="10626048" y="1092871"/>
-            <a:ext cx="617482" cy="697851"/>
+            <a:off x="10643857" y="1107193"/>
+            <a:ext cx="616425" cy="662697"/>
           </a:xfrm>
           <a:prstGeom prst="arc">
             <a:avLst>
@@ -17409,7 +17397,7 @@
                   </a:outerShdw>
                 </a:effectLst>
               </a:rPr>
-              <a:t>Structure du Site Web</a:t>
+              <a:t>  Structure du Site Web</a:t>
             </a:r>
           </a:p>
         </p:txBody>

</xml_diff>